<commit_message>
Added namespace info to WCF presentation
</commit_message>
<xml_diff>
--- a/Presentation/lesson-13-wcf.pptx
+++ b/Presentation/lesson-13-wcf.pptx
@@ -214,7 +214,7 @@
           <a:p>
             <a:fld id="{B24A7054-7FFB-49F4-A126-5DF6E687FF53}" type="datetimeFigureOut">
               <a:rPr lang="ru-RU" smtClean="0"/>
-              <a:t>27.03.2013</a:t>
+              <a:t>02.04.2013</a:t>
             </a:fld>
             <a:endParaRPr lang="ru-RU"/>
           </a:p>
@@ -1277,7 +1277,7 @@
           <a:p>
             <a:fld id="{8E6E6A2A-E9D3-4A0D-B04A-ABDD367A1E08}" type="datetimeFigureOut">
               <a:rPr lang="ru-RU" smtClean="0"/>
-              <a:t>27.03.2013</a:t>
+              <a:t>02.04.2013</a:t>
             </a:fld>
             <a:endParaRPr lang="ru-RU"/>
           </a:p>
@@ -2725,7 +2725,7 @@
           <a:p>
             <a:fld id="{AC3D3127-B7C4-45E3-9797-C527EC9FDD78}" type="datetimeFigureOut">
               <a:rPr lang="ru-RU" smtClean="0"/>
-              <a:t>27.03.2013</a:t>
+              <a:t>02.04.2013</a:t>
             </a:fld>
             <a:endParaRPr lang="ru-RU"/>
           </a:p>
@@ -5381,7 +5381,7 @@
               <a:t>OperationContract</a:t>
             </a:r>
             <a:r>
-              <a:rPr lang="en-US" dirty="0"/>
+              <a:rPr lang="en-US" dirty="0" smtClean="0"/>
               <a:t>]</a:t>
             </a:r>
           </a:p>
@@ -5473,7 +5473,7 @@
         <p:spPr>
           <a:xfrm>
             <a:off x="251520" y="980728"/>
-            <a:ext cx="8712968" cy="3785652"/>
+            <a:ext cx="8712968" cy="4278094"/>
           </a:xfrm>
           <a:prstGeom prst="rect">
             <a:avLst/>
@@ -5487,7 +5487,55 @@
           <a:lstStyle/>
           <a:p>
             <a:r>
-              <a:rPr lang="en-US" sz="1600" dirty="0">
+              <a:rPr lang="en-US" sz="1600" dirty="0" smtClean="0">
+                <a:solidFill>
+                  <a:srgbClr val="000000"/>
+                </a:solidFill>
+                <a:latin typeface="Courier New" pitchFamily="49" charset="0"/>
+                <a:cs typeface="Courier New" pitchFamily="49" charset="0"/>
+              </a:rPr>
+              <a:t>// </a:t>
+            </a:r>
+            <a:r>
+              <a:rPr lang="ru-RU" sz="1600" dirty="0" smtClean="0">
+                <a:solidFill>
+                  <a:srgbClr val="000000"/>
+                </a:solidFill>
+                <a:latin typeface="Courier New" pitchFamily="49" charset="0"/>
+                <a:cs typeface="Courier New" pitchFamily="49" charset="0"/>
+              </a:rPr>
+              <a:t>Не забудьте добавить ссылку на сборку </a:t>
+            </a:r>
+            <a:r>
+              <a:rPr lang="en-US" sz="1600" dirty="0" err="1">
+                <a:solidFill>
+                  <a:srgbClr val="000000"/>
+                </a:solidFill>
+                <a:latin typeface="Courier New" pitchFamily="49" charset="0"/>
+                <a:cs typeface="Courier New" pitchFamily="49" charset="0"/>
+              </a:rPr>
+              <a:t>System.ServiceModel</a:t>
+            </a:r>
+            <a:endParaRPr lang="en-US" sz="1600" dirty="0" smtClean="0">
+              <a:solidFill>
+                <a:srgbClr val="000000"/>
+              </a:solidFill>
+              <a:latin typeface="Courier New" pitchFamily="49" charset="0"/>
+              <a:cs typeface="Courier New" pitchFamily="49" charset="0"/>
+            </a:endParaRPr>
+          </a:p>
+          <a:p>
+            <a:endParaRPr lang="en-US" sz="1600" dirty="0">
+              <a:solidFill>
+                <a:srgbClr val="000000"/>
+              </a:solidFill>
+              <a:latin typeface="Courier New" pitchFamily="49" charset="0"/>
+              <a:cs typeface="Courier New" pitchFamily="49" charset="0"/>
+            </a:endParaRPr>
+          </a:p>
+          <a:p>
+            <a:r>
+              <a:rPr lang="en-US" sz="1600" dirty="0" smtClean="0">
                 <a:solidFill>
                   <a:srgbClr val="000000"/>
                 </a:solidFill>
@@ -6240,26 +6288,56 @@
           <a:lstStyle/>
           <a:p>
             <a:r>
-              <a:rPr lang="en-US" sz="1600" dirty="0">
-                <a:solidFill>
-                  <a:srgbClr val="000000"/>
-                </a:solidFill>
-                <a:latin typeface="Courier New" pitchFamily="49" charset="0"/>
-                <a:cs typeface="Courier New" pitchFamily="49" charset="0"/>
-              </a:rPr>
-              <a:t>namespace </a:t>
-            </a:r>
-            <a:r>
-              <a:rPr lang="en-US" sz="1600" dirty="0" err="1">
-                <a:solidFill>
-                  <a:srgbClr val="000000"/>
-                </a:solidFill>
-                <a:latin typeface="Courier New" pitchFamily="49" charset="0"/>
-                <a:cs typeface="Courier New" pitchFamily="49" charset="0"/>
-              </a:rPr>
-              <a:t>QuickReturns.StockTrading.ExchangeService.DataContracts</a:t>
-            </a:r>
-            <a:endParaRPr lang="en-US" sz="1600" dirty="0">
+              <a:rPr lang="en-US" sz="1400" dirty="0">
+                <a:solidFill>
+                  <a:srgbClr val="000000"/>
+                </a:solidFill>
+                <a:latin typeface="Courier New" pitchFamily="49" charset="0"/>
+                <a:cs typeface="Courier New" pitchFamily="49" charset="0"/>
+              </a:rPr>
+              <a:t>// </a:t>
+            </a:r>
+            <a:r>
+              <a:rPr lang="ru-RU" sz="1400" dirty="0">
+                <a:solidFill>
+                  <a:srgbClr val="000000"/>
+                </a:solidFill>
+                <a:latin typeface="Courier New" pitchFamily="49" charset="0"/>
+                <a:cs typeface="Courier New" pitchFamily="49" charset="0"/>
+              </a:rPr>
+              <a:t>Не забудьте добавить ссылку на </a:t>
+            </a:r>
+            <a:r>
+              <a:rPr lang="ru-RU" sz="1400" dirty="0" smtClean="0">
+                <a:solidFill>
+                  <a:srgbClr val="000000"/>
+                </a:solidFill>
+                <a:latin typeface="Courier New" pitchFamily="49" charset="0"/>
+                <a:cs typeface="Courier New" pitchFamily="49" charset="0"/>
+              </a:rPr>
+              <a:t>сборку</a:t>
+            </a:r>
+            <a:r>
+              <a:rPr lang="en-US" sz="1400" dirty="0">
+                <a:solidFill>
+                  <a:srgbClr val="000000"/>
+                </a:solidFill>
+                <a:latin typeface="Courier New" pitchFamily="49" charset="0"/>
+                <a:cs typeface="Courier New" pitchFamily="49" charset="0"/>
+              </a:rPr>
+              <a:t> </a:t>
+            </a:r>
+            <a:r>
+              <a:rPr lang="en-US" sz="1400" dirty="0" err="1">
+                <a:solidFill>
+                  <a:srgbClr val="000000"/>
+                </a:solidFill>
+                <a:latin typeface="Courier New" pitchFamily="49" charset="0"/>
+                <a:cs typeface="Courier New" pitchFamily="49" charset="0"/>
+              </a:rPr>
+              <a:t>System.Runtime.Serialization</a:t>
+            </a:r>
+            <a:endParaRPr lang="ru-RU" sz="1400" dirty="0" smtClean="0">
               <a:solidFill>
                 <a:srgbClr val="000000"/>
               </a:solidFill>
@@ -6269,132 +6347,36 @@
           </a:p>
           <a:p>
             <a:r>
-              <a:rPr lang="en-US" sz="1600" dirty="0">
-                <a:solidFill>
-                  <a:srgbClr val="000000"/>
-                </a:solidFill>
-                <a:latin typeface="Courier New" pitchFamily="49" charset="0"/>
-                <a:cs typeface="Courier New" pitchFamily="49" charset="0"/>
-              </a:rPr>
-              <a:t>{</a:t>
-            </a:r>
-          </a:p>
-          <a:p>
-            <a:r>
-              <a:rPr lang="ru-RU" sz="1600" dirty="0" smtClean="0">
-                <a:solidFill>
-                  <a:srgbClr val="000000"/>
-                </a:solidFill>
-                <a:latin typeface="Courier New" pitchFamily="49" charset="0"/>
-                <a:cs typeface="Courier New" pitchFamily="49" charset="0"/>
-              </a:rPr>
-              <a:t>    </a:t>
-            </a:r>
-            <a:r>
-              <a:rPr lang="en-US" sz="1600" dirty="0" smtClean="0">
-                <a:solidFill>
-                  <a:srgbClr val="000000"/>
-                </a:solidFill>
-                <a:latin typeface="Courier New" pitchFamily="49" charset="0"/>
-                <a:cs typeface="Courier New" pitchFamily="49" charset="0"/>
-              </a:rPr>
-              <a:t>[</a:t>
-            </a:r>
-            <a:r>
-              <a:rPr lang="en-US" sz="1600" dirty="0" err="1" smtClean="0">
-                <a:solidFill>
-                  <a:srgbClr val="000000"/>
-                </a:solidFill>
-                <a:latin typeface="Courier New" pitchFamily="49" charset="0"/>
-                <a:cs typeface="Courier New" pitchFamily="49" charset="0"/>
-              </a:rPr>
-              <a:t>DataContract</a:t>
-            </a:r>
-            <a:r>
-              <a:rPr lang="en-US" sz="1600" dirty="0" smtClean="0">
-                <a:solidFill>
-                  <a:srgbClr val="000000"/>
-                </a:solidFill>
-                <a:latin typeface="Courier New" pitchFamily="49" charset="0"/>
-                <a:cs typeface="Courier New" pitchFamily="49" charset="0"/>
-              </a:rPr>
-              <a:t>(Namespace</a:t>
-            </a:r>
-            <a:r>
-              <a:rPr lang="en-US" sz="1600" dirty="0">
-                <a:solidFill>
-                  <a:srgbClr val="000000"/>
-                </a:solidFill>
-                <a:latin typeface="Courier New" pitchFamily="49" charset="0"/>
-                <a:cs typeface="Courier New" pitchFamily="49" charset="0"/>
-              </a:rPr>
-              <a:t>=" http://QuickReturns")]</a:t>
-            </a:r>
-          </a:p>
-          <a:p>
-            <a:r>
-              <a:rPr lang="ru-RU" sz="1600" dirty="0">
-                <a:solidFill>
-                  <a:srgbClr val="000000"/>
-                </a:solidFill>
-                <a:latin typeface="Courier New" pitchFamily="49" charset="0"/>
-                <a:cs typeface="Courier New" pitchFamily="49" charset="0"/>
-              </a:rPr>
-              <a:t> </a:t>
-            </a:r>
-            <a:r>
-              <a:rPr lang="ru-RU" sz="1600" dirty="0" smtClean="0">
-                <a:solidFill>
-                  <a:srgbClr val="000000"/>
-                </a:solidFill>
-                <a:latin typeface="Courier New" pitchFamily="49" charset="0"/>
-                <a:cs typeface="Courier New" pitchFamily="49" charset="0"/>
-              </a:rPr>
-              <a:t>   </a:t>
-            </a:r>
-            <a:r>
-              <a:rPr lang="en-US" sz="1600" dirty="0" smtClean="0">
-                <a:solidFill>
-                  <a:srgbClr val="000000"/>
-                </a:solidFill>
-                <a:latin typeface="Courier New" pitchFamily="49" charset="0"/>
-                <a:cs typeface="Courier New" pitchFamily="49" charset="0"/>
-              </a:rPr>
-              <a:t>public </a:t>
-            </a:r>
-            <a:r>
-              <a:rPr lang="en-US" sz="1600" dirty="0">
-                <a:solidFill>
-                  <a:srgbClr val="000000"/>
-                </a:solidFill>
-                <a:latin typeface="Courier New" pitchFamily="49" charset="0"/>
-                <a:cs typeface="Courier New" pitchFamily="49" charset="0"/>
-              </a:rPr>
-              <a:t>class Quote</a:t>
-            </a:r>
-          </a:p>
-          <a:p>
-            <a:r>
-              <a:rPr lang="ru-RU" sz="1600" dirty="0" smtClean="0">
-                <a:solidFill>
-                  <a:srgbClr val="000000"/>
-                </a:solidFill>
-                <a:latin typeface="Courier New" pitchFamily="49" charset="0"/>
-                <a:cs typeface="Courier New" pitchFamily="49" charset="0"/>
-              </a:rPr>
-              <a:t>    </a:t>
-            </a:r>
-            <a:r>
-              <a:rPr lang="en-US" sz="1600" dirty="0" smtClean="0">
-                <a:solidFill>
-                  <a:srgbClr val="000000"/>
-                </a:solidFill>
-                <a:latin typeface="Courier New" pitchFamily="49" charset="0"/>
-                <a:cs typeface="Courier New" pitchFamily="49" charset="0"/>
-              </a:rPr>
-              <a:t>{</a:t>
-            </a:r>
-            <a:endParaRPr lang="en-US" sz="1600" dirty="0">
+              <a:rPr lang="en-US" sz="1400" dirty="0">
+                <a:solidFill>
+                  <a:srgbClr val="000000"/>
+                </a:solidFill>
+                <a:latin typeface="Courier New" pitchFamily="49" charset="0"/>
+                <a:cs typeface="Courier New" pitchFamily="49" charset="0"/>
+              </a:rPr>
+              <a:t>using </a:t>
+            </a:r>
+            <a:r>
+              <a:rPr lang="en-US" sz="1400" dirty="0" err="1" smtClean="0">
+                <a:solidFill>
+                  <a:srgbClr val="000000"/>
+                </a:solidFill>
+                <a:latin typeface="Courier New" pitchFamily="49" charset="0"/>
+                <a:cs typeface="Courier New" pitchFamily="49" charset="0"/>
+              </a:rPr>
+              <a:t>System.Runtime.Serialization</a:t>
+            </a:r>
+            <a:r>
+              <a:rPr lang="en-US" sz="1400" dirty="0" smtClean="0">
+                <a:solidFill>
+                  <a:srgbClr val="000000"/>
+                </a:solidFill>
+                <a:latin typeface="Courier New" pitchFamily="49" charset="0"/>
+                <a:cs typeface="Courier New" pitchFamily="49" charset="0"/>
+              </a:rPr>
+              <a:t>;</a:t>
+            </a:r>
+            <a:endParaRPr lang="ru-RU" sz="1400" dirty="0">
               <a:solidFill>
                 <a:srgbClr val="000000"/>
               </a:solidFill>
@@ -6403,89 +6385,7 @@
             </a:endParaRPr>
           </a:p>
           <a:p>
-            <a:r>
-              <a:rPr lang="ru-RU" sz="1600" dirty="0" smtClean="0">
-                <a:solidFill>
-                  <a:srgbClr val="000000"/>
-                </a:solidFill>
-                <a:latin typeface="Courier New" pitchFamily="49" charset="0"/>
-                <a:cs typeface="Courier New" pitchFamily="49" charset="0"/>
-              </a:rPr>
-              <a:t>        </a:t>
-            </a:r>
-            <a:r>
-              <a:rPr lang="en-US" sz="1600" dirty="0" smtClean="0">
-                <a:solidFill>
-                  <a:srgbClr val="000000"/>
-                </a:solidFill>
-                <a:latin typeface="Courier New" pitchFamily="49" charset="0"/>
-                <a:cs typeface="Courier New" pitchFamily="49" charset="0"/>
-              </a:rPr>
-              <a:t>[</a:t>
-            </a:r>
-            <a:r>
-              <a:rPr lang="en-US" sz="1600" dirty="0" err="1">
-                <a:solidFill>
-                  <a:srgbClr val="000000"/>
-                </a:solidFill>
-                <a:latin typeface="Courier New" pitchFamily="49" charset="0"/>
-                <a:cs typeface="Courier New" pitchFamily="49" charset="0"/>
-              </a:rPr>
-              <a:t>DataMember</a:t>
-            </a:r>
-            <a:r>
-              <a:rPr lang="en-US" sz="1600" dirty="0">
-                <a:solidFill>
-                  <a:srgbClr val="000000"/>
-                </a:solidFill>
-                <a:latin typeface="Courier New" pitchFamily="49" charset="0"/>
-                <a:cs typeface="Courier New" pitchFamily="49" charset="0"/>
-              </a:rPr>
-              <a:t>(Name="Ticker")]</a:t>
-            </a:r>
-          </a:p>
-          <a:p>
-            <a:r>
-              <a:rPr lang="ru-RU" sz="1600" dirty="0" smtClean="0">
-                <a:solidFill>
-                  <a:srgbClr val="000000"/>
-                </a:solidFill>
-                <a:latin typeface="Courier New" pitchFamily="49" charset="0"/>
-                <a:cs typeface="Courier New" pitchFamily="49" charset="0"/>
-              </a:rPr>
-              <a:t>        </a:t>
-            </a:r>
-            <a:r>
-              <a:rPr lang="en-US" sz="1600" dirty="0" smtClean="0">
-                <a:solidFill>
-                  <a:srgbClr val="000000"/>
-                </a:solidFill>
-                <a:latin typeface="Courier New" pitchFamily="49" charset="0"/>
-                <a:cs typeface="Courier New" pitchFamily="49" charset="0"/>
-              </a:rPr>
-              <a:t>public </a:t>
-            </a:r>
-            <a:r>
-              <a:rPr lang="en-US" sz="1600" dirty="0">
-                <a:solidFill>
-                  <a:srgbClr val="000000"/>
-                </a:solidFill>
-                <a:latin typeface="Courier New" pitchFamily="49" charset="0"/>
-                <a:cs typeface="Courier New" pitchFamily="49" charset="0"/>
-              </a:rPr>
-              <a:t>string Ticker</a:t>
-            </a:r>
-            <a:r>
-              <a:rPr lang="en-US" sz="1600" dirty="0" smtClean="0">
-                <a:solidFill>
-                  <a:srgbClr val="000000"/>
-                </a:solidFill>
-                <a:latin typeface="Courier New" pitchFamily="49" charset="0"/>
-                <a:cs typeface="Courier New" pitchFamily="49" charset="0"/>
-              </a:rPr>
-              <a:t>;</a:t>
-            </a:r>
-            <a:endParaRPr lang="ru-RU" sz="1600" dirty="0" smtClean="0">
+            <a:endParaRPr lang="ru-RU" sz="1400" dirty="0" smtClean="0">
               <a:solidFill>
                 <a:srgbClr val="000000"/>
               </a:solidFill>
@@ -6495,26 +6395,26 @@
           </a:p>
           <a:p>
             <a:r>
-              <a:rPr lang="ru-RU" sz="1600" dirty="0">
-                <a:solidFill>
-                  <a:srgbClr val="000000"/>
-                </a:solidFill>
-                <a:latin typeface="Courier New" pitchFamily="49" charset="0"/>
-                <a:cs typeface="Courier New" pitchFamily="49" charset="0"/>
-              </a:rPr>
-              <a:t> </a:t>
-            </a:r>
-            <a:r>
-              <a:rPr lang="ru-RU" sz="1600" dirty="0" smtClean="0">
-                <a:solidFill>
-                  <a:srgbClr val="000000"/>
-                </a:solidFill>
-                <a:latin typeface="Courier New" pitchFamily="49" charset="0"/>
-                <a:cs typeface="Courier New" pitchFamily="49" charset="0"/>
-              </a:rPr>
-              <a:t>       </a:t>
-            </a:r>
-            <a:endParaRPr lang="en-US" sz="1600" dirty="0">
+              <a:rPr lang="en-US" sz="1400" dirty="0" smtClean="0">
+                <a:solidFill>
+                  <a:srgbClr val="000000"/>
+                </a:solidFill>
+                <a:latin typeface="Courier New" pitchFamily="49" charset="0"/>
+                <a:cs typeface="Courier New" pitchFamily="49" charset="0"/>
+              </a:rPr>
+              <a:t>namespace </a:t>
+            </a:r>
+            <a:r>
+              <a:rPr lang="en-US" sz="1400" dirty="0" err="1">
+                <a:solidFill>
+                  <a:srgbClr val="000000"/>
+                </a:solidFill>
+                <a:latin typeface="Courier New" pitchFamily="49" charset="0"/>
+                <a:cs typeface="Courier New" pitchFamily="49" charset="0"/>
+              </a:rPr>
+              <a:t>QuickReturns.StockTrading.ExchangeService.DataContracts</a:t>
+            </a:r>
+            <a:endParaRPr lang="en-US" sz="1400" dirty="0">
               <a:solidFill>
                 <a:srgbClr val="000000"/>
               </a:solidFill>
@@ -6524,17 +6424,29 @@
           </a:p>
           <a:p>
             <a:r>
-              <a:rPr lang="ru-RU" sz="1600" dirty="0" smtClean="0">
-                <a:solidFill>
-                  <a:srgbClr val="000000"/>
-                </a:solidFill>
-                <a:latin typeface="Courier New" pitchFamily="49" charset="0"/>
-                <a:cs typeface="Courier New" pitchFamily="49" charset="0"/>
-              </a:rPr>
-              <a:t>        </a:t>
-            </a:r>
-            <a:r>
-              <a:rPr lang="en-US" sz="1600" dirty="0" smtClean="0">
+              <a:rPr lang="en-US" sz="1400" dirty="0">
+                <a:solidFill>
+                  <a:srgbClr val="000000"/>
+                </a:solidFill>
+                <a:latin typeface="Courier New" pitchFamily="49" charset="0"/>
+                <a:cs typeface="Courier New" pitchFamily="49" charset="0"/>
+              </a:rPr>
+              <a:t>{</a:t>
+            </a:r>
+          </a:p>
+          <a:p>
+            <a:r>
+              <a:rPr lang="ru-RU" sz="1400" dirty="0" smtClean="0">
+                <a:solidFill>
+                  <a:srgbClr val="000000"/>
+                </a:solidFill>
+                <a:latin typeface="Courier New" pitchFamily="49" charset="0"/>
+                <a:cs typeface="Courier New" pitchFamily="49" charset="0"/>
+              </a:rPr>
+              <a:t>    </a:t>
+            </a:r>
+            <a:r>
+              <a:rPr lang="en-US" sz="1400" dirty="0" smtClean="0">
                 <a:solidFill>
                   <a:srgbClr val="000000"/>
                 </a:solidFill>
@@ -6544,39 +6456,59 @@
               <a:t>[</a:t>
             </a:r>
             <a:r>
-              <a:rPr lang="en-US" sz="1600" dirty="0" err="1">
-                <a:solidFill>
-                  <a:srgbClr val="000000"/>
-                </a:solidFill>
-                <a:latin typeface="Courier New" pitchFamily="49" charset="0"/>
-                <a:cs typeface="Courier New" pitchFamily="49" charset="0"/>
-              </a:rPr>
-              <a:t>DataMember</a:t>
-            </a:r>
-            <a:r>
-              <a:rPr lang="en-US" sz="1600" dirty="0">
-                <a:solidFill>
-                  <a:srgbClr val="000000"/>
-                </a:solidFill>
-                <a:latin typeface="Courier New" pitchFamily="49" charset="0"/>
-                <a:cs typeface="Courier New" pitchFamily="49" charset="0"/>
-              </a:rPr>
-              <a:t>(Name="Bid")]</a:t>
-            </a:r>
-          </a:p>
-          <a:p>
-            <a:r>
-              <a:rPr lang="ru-RU" sz="1600" dirty="0" smtClean="0">
-                <a:solidFill>
-                  <a:srgbClr val="000000"/>
-                </a:solidFill>
-                <a:latin typeface="Courier New" pitchFamily="49" charset="0"/>
-                <a:cs typeface="Courier New" pitchFamily="49" charset="0"/>
-              </a:rPr>
-              <a:t>        </a:t>
-            </a:r>
-            <a:r>
-              <a:rPr lang="en-US" sz="1600" dirty="0" smtClean="0">
+              <a:rPr lang="en-US" sz="1400" dirty="0" err="1" smtClean="0">
+                <a:solidFill>
+                  <a:srgbClr val="000000"/>
+                </a:solidFill>
+                <a:latin typeface="Courier New" pitchFamily="49" charset="0"/>
+                <a:cs typeface="Courier New" pitchFamily="49" charset="0"/>
+              </a:rPr>
+              <a:t>DataContract</a:t>
+            </a:r>
+            <a:r>
+              <a:rPr lang="en-US" sz="1400" dirty="0" smtClean="0">
+                <a:solidFill>
+                  <a:srgbClr val="000000"/>
+                </a:solidFill>
+                <a:latin typeface="Courier New" pitchFamily="49" charset="0"/>
+                <a:cs typeface="Courier New" pitchFamily="49" charset="0"/>
+              </a:rPr>
+              <a:t>(Namespace</a:t>
+            </a:r>
+            <a:r>
+              <a:rPr lang="en-US" sz="1400" dirty="0">
+                <a:solidFill>
+                  <a:srgbClr val="000000"/>
+                </a:solidFill>
+                <a:latin typeface="Courier New" pitchFamily="49" charset="0"/>
+                <a:cs typeface="Courier New" pitchFamily="49" charset="0"/>
+              </a:rPr>
+              <a:t>=" http://QuickReturns")]</a:t>
+            </a:r>
+          </a:p>
+          <a:p>
+            <a:r>
+              <a:rPr lang="ru-RU" sz="1400" dirty="0">
+                <a:solidFill>
+                  <a:srgbClr val="000000"/>
+                </a:solidFill>
+                <a:latin typeface="Courier New" pitchFamily="49" charset="0"/>
+                <a:cs typeface="Courier New" pitchFamily="49" charset="0"/>
+              </a:rPr>
+              <a:t> </a:t>
+            </a:r>
+            <a:r>
+              <a:rPr lang="ru-RU" sz="1400" dirty="0" smtClean="0">
+                <a:solidFill>
+                  <a:srgbClr val="000000"/>
+                </a:solidFill>
+                <a:latin typeface="Courier New" pitchFamily="49" charset="0"/>
+                <a:cs typeface="Courier New" pitchFamily="49" charset="0"/>
+              </a:rPr>
+              <a:t>   </a:t>
+            </a:r>
+            <a:r>
+              <a:rPr lang="en-US" sz="1400" dirty="0" smtClean="0">
                 <a:solidFill>
                   <a:srgbClr val="000000"/>
                 </a:solidFill>
@@ -6586,327 +6518,19 @@
               <a:t>public </a:t>
             </a:r>
             <a:r>
-              <a:rPr lang="en-US" sz="1600" dirty="0">
-                <a:solidFill>
-                  <a:srgbClr val="000000"/>
-                </a:solidFill>
-                <a:latin typeface="Courier New" pitchFamily="49" charset="0"/>
-                <a:cs typeface="Courier New" pitchFamily="49" charset="0"/>
-              </a:rPr>
-              <a:t>decimal Bid;</a:t>
-            </a:r>
-          </a:p>
-          <a:p>
-            <a:r>
-              <a:rPr lang="ru-RU" sz="1600" dirty="0" smtClean="0">
-                <a:solidFill>
-                  <a:srgbClr val="000000"/>
-                </a:solidFill>
-                <a:latin typeface="Courier New" pitchFamily="49" charset="0"/>
-                <a:cs typeface="Courier New" pitchFamily="49" charset="0"/>
-              </a:rPr>
-              <a:t>        </a:t>
-            </a:r>
-          </a:p>
-          <a:p>
-            <a:r>
-              <a:rPr lang="ru-RU" sz="1600" dirty="0" smtClean="0">
-                <a:solidFill>
-                  <a:srgbClr val="000000"/>
-                </a:solidFill>
-                <a:latin typeface="Courier New" pitchFamily="49" charset="0"/>
-                <a:cs typeface="Courier New" pitchFamily="49" charset="0"/>
-              </a:rPr>
-              <a:t>        </a:t>
-            </a:r>
-            <a:r>
-              <a:rPr lang="en-US" sz="1600" dirty="0" smtClean="0">
-                <a:solidFill>
-                  <a:srgbClr val="000000"/>
-                </a:solidFill>
-                <a:latin typeface="Courier New" pitchFamily="49" charset="0"/>
-                <a:cs typeface="Courier New" pitchFamily="49" charset="0"/>
-              </a:rPr>
-              <a:t>[</a:t>
-            </a:r>
-            <a:r>
-              <a:rPr lang="en-US" sz="1600" dirty="0" err="1">
-                <a:solidFill>
-                  <a:srgbClr val="000000"/>
-                </a:solidFill>
-                <a:latin typeface="Courier New" pitchFamily="49" charset="0"/>
-                <a:cs typeface="Courier New" pitchFamily="49" charset="0"/>
-              </a:rPr>
-              <a:t>DataMember</a:t>
-            </a:r>
-            <a:r>
-              <a:rPr lang="en-US" sz="1600" dirty="0">
-                <a:solidFill>
-                  <a:srgbClr val="000000"/>
-                </a:solidFill>
-                <a:latin typeface="Courier New" pitchFamily="49" charset="0"/>
-                <a:cs typeface="Courier New" pitchFamily="49" charset="0"/>
-              </a:rPr>
-              <a:t>(Name="Ask")]</a:t>
-            </a:r>
-          </a:p>
-          <a:p>
-            <a:r>
-              <a:rPr lang="ru-RU" sz="1600" dirty="0" smtClean="0">
-                <a:solidFill>
-                  <a:srgbClr val="000000"/>
-                </a:solidFill>
-                <a:latin typeface="Courier New" pitchFamily="49" charset="0"/>
-                <a:cs typeface="Courier New" pitchFamily="49" charset="0"/>
-              </a:rPr>
-              <a:t>        </a:t>
-            </a:r>
-            <a:r>
-              <a:rPr lang="en-US" sz="1600" dirty="0" smtClean="0">
-                <a:solidFill>
-                  <a:srgbClr val="000000"/>
-                </a:solidFill>
-                <a:latin typeface="Courier New" pitchFamily="49" charset="0"/>
-                <a:cs typeface="Courier New" pitchFamily="49" charset="0"/>
-              </a:rPr>
-              <a:t>public </a:t>
-            </a:r>
-            <a:r>
-              <a:rPr lang="en-US" sz="1600" dirty="0">
-                <a:solidFill>
-                  <a:srgbClr val="000000"/>
-                </a:solidFill>
-                <a:latin typeface="Courier New" pitchFamily="49" charset="0"/>
-                <a:cs typeface="Courier New" pitchFamily="49" charset="0"/>
-              </a:rPr>
-              <a:t>decimal Ask;</a:t>
-            </a:r>
-          </a:p>
-          <a:p>
-            <a:r>
-              <a:rPr lang="ru-RU" sz="1600" dirty="0" smtClean="0">
-                <a:solidFill>
-                  <a:srgbClr val="000000"/>
-                </a:solidFill>
-                <a:latin typeface="Courier New" pitchFamily="49" charset="0"/>
-                <a:cs typeface="Courier New" pitchFamily="49" charset="0"/>
-              </a:rPr>
-              <a:t>        </a:t>
-            </a:r>
-          </a:p>
-          <a:p>
-            <a:r>
-              <a:rPr lang="ru-RU" sz="1600" dirty="0" smtClean="0">
-                <a:solidFill>
-                  <a:srgbClr val="000000"/>
-                </a:solidFill>
-                <a:latin typeface="Courier New" pitchFamily="49" charset="0"/>
-                <a:cs typeface="Courier New" pitchFamily="49" charset="0"/>
-              </a:rPr>
-              <a:t>        </a:t>
-            </a:r>
-            <a:r>
-              <a:rPr lang="en-US" sz="1600" dirty="0" smtClean="0">
-                <a:solidFill>
-                  <a:srgbClr val="000000"/>
-                </a:solidFill>
-                <a:latin typeface="Courier New" pitchFamily="49" charset="0"/>
-                <a:cs typeface="Courier New" pitchFamily="49" charset="0"/>
-              </a:rPr>
-              <a:t>[</a:t>
-            </a:r>
-            <a:r>
-              <a:rPr lang="en-US" sz="1600" dirty="0" err="1">
-                <a:solidFill>
-                  <a:srgbClr val="000000"/>
-                </a:solidFill>
-                <a:latin typeface="Courier New" pitchFamily="49" charset="0"/>
-                <a:cs typeface="Courier New" pitchFamily="49" charset="0"/>
-              </a:rPr>
-              <a:t>DataMember</a:t>
-            </a:r>
-            <a:r>
-              <a:rPr lang="en-US" sz="1600" dirty="0">
-                <a:solidFill>
-                  <a:srgbClr val="000000"/>
-                </a:solidFill>
-                <a:latin typeface="Courier New" pitchFamily="49" charset="0"/>
-                <a:cs typeface="Courier New" pitchFamily="49" charset="0"/>
-              </a:rPr>
-              <a:t>(Name="Publisher")]</a:t>
-            </a:r>
-          </a:p>
-          <a:p>
-            <a:r>
-              <a:rPr lang="ru-RU" sz="1600" dirty="0" smtClean="0">
-                <a:solidFill>
-                  <a:srgbClr val="000000"/>
-                </a:solidFill>
-                <a:latin typeface="Courier New" pitchFamily="49" charset="0"/>
-                <a:cs typeface="Courier New" pitchFamily="49" charset="0"/>
-              </a:rPr>
-              <a:t>        </a:t>
-            </a:r>
-            <a:r>
-              <a:rPr lang="en-US" sz="1600" dirty="0" smtClean="0">
-                <a:solidFill>
-                  <a:srgbClr val="000000"/>
-                </a:solidFill>
-                <a:latin typeface="Courier New" pitchFamily="49" charset="0"/>
-                <a:cs typeface="Courier New" pitchFamily="49" charset="0"/>
-              </a:rPr>
-              <a:t>public </a:t>
-            </a:r>
-            <a:r>
-              <a:rPr lang="en-US" sz="1600" dirty="0">
-                <a:solidFill>
-                  <a:srgbClr val="000000"/>
-                </a:solidFill>
-                <a:latin typeface="Courier New" pitchFamily="49" charset="0"/>
-                <a:cs typeface="Courier New" pitchFamily="49" charset="0"/>
-              </a:rPr>
-              <a:t>string Publisher;</a:t>
-            </a:r>
-          </a:p>
-          <a:p>
-            <a:r>
-              <a:rPr lang="ru-RU" sz="1600" dirty="0" smtClean="0">
-                <a:solidFill>
-                  <a:srgbClr val="000000"/>
-                </a:solidFill>
-                <a:latin typeface="Courier New" pitchFamily="49" charset="0"/>
-                <a:cs typeface="Courier New" pitchFamily="49" charset="0"/>
-              </a:rPr>
-              <a:t>        </a:t>
-            </a:r>
-          </a:p>
-          <a:p>
-            <a:r>
-              <a:rPr lang="ru-RU" sz="1600" dirty="0" smtClean="0">
-                <a:solidFill>
-                  <a:srgbClr val="000000"/>
-                </a:solidFill>
-                <a:latin typeface="Courier New" pitchFamily="49" charset="0"/>
-                <a:cs typeface="Courier New" pitchFamily="49" charset="0"/>
-              </a:rPr>
-              <a:t>        </a:t>
-            </a:r>
-            <a:r>
-              <a:rPr lang="en-US" sz="1600" dirty="0" smtClean="0">
-                <a:solidFill>
-                  <a:srgbClr val="000000"/>
-                </a:solidFill>
-                <a:latin typeface="Courier New" pitchFamily="49" charset="0"/>
-                <a:cs typeface="Courier New" pitchFamily="49" charset="0"/>
-              </a:rPr>
-              <a:t>[</a:t>
-            </a:r>
-            <a:r>
-              <a:rPr lang="en-US" sz="1600" dirty="0" err="1">
-                <a:solidFill>
-                  <a:srgbClr val="000000"/>
-                </a:solidFill>
-                <a:latin typeface="Courier New" pitchFamily="49" charset="0"/>
-                <a:cs typeface="Courier New" pitchFamily="49" charset="0"/>
-              </a:rPr>
-              <a:t>DataMember</a:t>
-            </a:r>
-            <a:r>
-              <a:rPr lang="en-US" sz="1600" dirty="0">
-                <a:solidFill>
-                  <a:srgbClr val="000000"/>
-                </a:solidFill>
-                <a:latin typeface="Courier New" pitchFamily="49" charset="0"/>
-                <a:cs typeface="Courier New" pitchFamily="49" charset="0"/>
-              </a:rPr>
-              <a:t>(Name="</a:t>
-            </a:r>
-            <a:r>
-              <a:rPr lang="en-US" sz="1600" dirty="0" err="1">
-                <a:solidFill>
-                  <a:srgbClr val="000000"/>
-                </a:solidFill>
-                <a:latin typeface="Courier New" pitchFamily="49" charset="0"/>
-                <a:cs typeface="Courier New" pitchFamily="49" charset="0"/>
-              </a:rPr>
-              <a:t>UpdateDateTime</a:t>
-            </a:r>
-            <a:r>
-              <a:rPr lang="en-US" sz="1600" dirty="0">
-                <a:solidFill>
-                  <a:srgbClr val="000000"/>
-                </a:solidFill>
-                <a:latin typeface="Courier New" pitchFamily="49" charset="0"/>
-                <a:cs typeface="Courier New" pitchFamily="49" charset="0"/>
-              </a:rPr>
-              <a:t>")]</a:t>
-            </a:r>
-          </a:p>
-          <a:p>
-            <a:r>
-              <a:rPr lang="ru-RU" sz="1600" dirty="0" smtClean="0">
-                <a:solidFill>
-                  <a:srgbClr val="000000"/>
-                </a:solidFill>
-                <a:latin typeface="Courier New" pitchFamily="49" charset="0"/>
-                <a:cs typeface="Courier New" pitchFamily="49" charset="0"/>
-              </a:rPr>
-              <a:t>        </a:t>
-            </a:r>
-            <a:r>
-              <a:rPr lang="en-US" sz="1600" dirty="0" smtClean="0">
-                <a:solidFill>
-                  <a:srgbClr val="000000"/>
-                </a:solidFill>
-                <a:latin typeface="Courier New" pitchFamily="49" charset="0"/>
-                <a:cs typeface="Courier New" pitchFamily="49" charset="0"/>
-              </a:rPr>
-              <a:t>private </a:t>
-            </a:r>
-            <a:r>
-              <a:rPr lang="en-US" sz="1600" dirty="0" err="1">
-                <a:solidFill>
-                  <a:srgbClr val="000000"/>
-                </a:solidFill>
-                <a:latin typeface="Courier New" pitchFamily="49" charset="0"/>
-                <a:cs typeface="Courier New" pitchFamily="49" charset="0"/>
-              </a:rPr>
-              <a:t>DateTime</a:t>
-            </a:r>
-            <a:r>
-              <a:rPr lang="en-US" sz="1600" dirty="0">
-                <a:solidFill>
-                  <a:srgbClr val="000000"/>
-                </a:solidFill>
-                <a:latin typeface="Courier New" pitchFamily="49" charset="0"/>
-                <a:cs typeface="Courier New" pitchFamily="49" charset="0"/>
-              </a:rPr>
-              <a:t> </a:t>
-            </a:r>
-            <a:r>
-              <a:rPr lang="en-US" sz="1600" dirty="0" err="1">
-                <a:solidFill>
-                  <a:srgbClr val="000000"/>
-                </a:solidFill>
-                <a:latin typeface="Courier New" pitchFamily="49" charset="0"/>
-                <a:cs typeface="Courier New" pitchFamily="49" charset="0"/>
-              </a:rPr>
-              <a:t>UpdateDateTime</a:t>
-            </a:r>
-            <a:r>
-              <a:rPr lang="en-US" sz="1600" dirty="0">
-                <a:solidFill>
-                  <a:srgbClr val="000000"/>
-                </a:solidFill>
-                <a:latin typeface="Courier New" pitchFamily="49" charset="0"/>
-                <a:cs typeface="Courier New" pitchFamily="49" charset="0"/>
-              </a:rPr>
-              <a:t>;</a:t>
-            </a:r>
-          </a:p>
-          <a:p>
-            <a:r>
-              <a:rPr lang="ru-RU" sz="1600" dirty="0" smtClean="0">
+              <a:rPr lang="en-US" sz="1400" dirty="0">
+                <a:solidFill>
+                  <a:srgbClr val="000000"/>
+                </a:solidFill>
+                <a:latin typeface="Courier New" pitchFamily="49" charset="0"/>
+                <a:cs typeface="Courier New" pitchFamily="49" charset="0"/>
+              </a:rPr>
+              <a:t>class Quote</a:t>
+            </a:r>
+          </a:p>
+          <a:p>
+            <a:r>
+              <a:rPr lang="ru-RU" sz="1400" dirty="0" smtClean="0">
                 <a:solidFill>
                   <a:srgbClr val="000000"/>
                 </a:solidFill>
@@ -6916,16 +6540,16 @@
               <a:t>    </a:t>
             </a:r>
             <a:r>
-              <a:rPr lang="en-US" sz="1600" dirty="0" smtClean="0">
-                <a:solidFill>
-                  <a:srgbClr val="000000"/>
-                </a:solidFill>
-                <a:latin typeface="Courier New" pitchFamily="49" charset="0"/>
-                <a:cs typeface="Courier New" pitchFamily="49" charset="0"/>
-              </a:rPr>
-              <a:t>}</a:t>
-            </a:r>
-            <a:endParaRPr lang="en-US" sz="1600" dirty="0">
+              <a:rPr lang="en-US" sz="1400" dirty="0" smtClean="0">
+                <a:solidFill>
+                  <a:srgbClr val="000000"/>
+                </a:solidFill>
+                <a:latin typeface="Courier New" pitchFamily="49" charset="0"/>
+                <a:cs typeface="Courier New" pitchFamily="49" charset="0"/>
+              </a:rPr>
+              <a:t>{</a:t>
+            </a:r>
+            <a:endParaRPr lang="en-US" sz="1400" dirty="0">
               <a:solidFill>
                 <a:srgbClr val="000000"/>
               </a:solidFill>
@@ -6935,7 +6559,519 @@
           </a:p>
           <a:p>
             <a:r>
-              <a:rPr lang="en-US" sz="1600" dirty="0">
+              <a:rPr lang="ru-RU" sz="1400" dirty="0" smtClean="0">
+                <a:solidFill>
+                  <a:srgbClr val="000000"/>
+                </a:solidFill>
+                <a:latin typeface="Courier New" pitchFamily="49" charset="0"/>
+                <a:cs typeface="Courier New" pitchFamily="49" charset="0"/>
+              </a:rPr>
+              <a:t>        </a:t>
+            </a:r>
+            <a:r>
+              <a:rPr lang="en-US" sz="1400" dirty="0" smtClean="0">
+                <a:solidFill>
+                  <a:srgbClr val="000000"/>
+                </a:solidFill>
+                <a:latin typeface="Courier New" pitchFamily="49" charset="0"/>
+                <a:cs typeface="Courier New" pitchFamily="49" charset="0"/>
+              </a:rPr>
+              <a:t>[</a:t>
+            </a:r>
+            <a:r>
+              <a:rPr lang="en-US" sz="1400" dirty="0" err="1">
+                <a:solidFill>
+                  <a:srgbClr val="000000"/>
+                </a:solidFill>
+                <a:latin typeface="Courier New" pitchFamily="49" charset="0"/>
+                <a:cs typeface="Courier New" pitchFamily="49" charset="0"/>
+              </a:rPr>
+              <a:t>DataMember</a:t>
+            </a:r>
+            <a:r>
+              <a:rPr lang="en-US" sz="1400" dirty="0">
+                <a:solidFill>
+                  <a:srgbClr val="000000"/>
+                </a:solidFill>
+                <a:latin typeface="Courier New" pitchFamily="49" charset="0"/>
+                <a:cs typeface="Courier New" pitchFamily="49" charset="0"/>
+              </a:rPr>
+              <a:t>(Name="Ticker")]</a:t>
+            </a:r>
+          </a:p>
+          <a:p>
+            <a:r>
+              <a:rPr lang="ru-RU" sz="1400" dirty="0" smtClean="0">
+                <a:solidFill>
+                  <a:srgbClr val="000000"/>
+                </a:solidFill>
+                <a:latin typeface="Courier New" pitchFamily="49" charset="0"/>
+                <a:cs typeface="Courier New" pitchFamily="49" charset="0"/>
+              </a:rPr>
+              <a:t>        </a:t>
+            </a:r>
+            <a:r>
+              <a:rPr lang="en-US" sz="1400" dirty="0" smtClean="0">
+                <a:solidFill>
+                  <a:srgbClr val="000000"/>
+                </a:solidFill>
+                <a:latin typeface="Courier New" pitchFamily="49" charset="0"/>
+                <a:cs typeface="Courier New" pitchFamily="49" charset="0"/>
+              </a:rPr>
+              <a:t>public </a:t>
+            </a:r>
+            <a:r>
+              <a:rPr lang="en-US" sz="1400" dirty="0">
+                <a:solidFill>
+                  <a:srgbClr val="000000"/>
+                </a:solidFill>
+                <a:latin typeface="Courier New" pitchFamily="49" charset="0"/>
+                <a:cs typeface="Courier New" pitchFamily="49" charset="0"/>
+              </a:rPr>
+              <a:t>string Ticker</a:t>
+            </a:r>
+            <a:r>
+              <a:rPr lang="en-US" sz="1400" dirty="0" smtClean="0">
+                <a:solidFill>
+                  <a:srgbClr val="000000"/>
+                </a:solidFill>
+                <a:latin typeface="Courier New" pitchFamily="49" charset="0"/>
+                <a:cs typeface="Courier New" pitchFamily="49" charset="0"/>
+              </a:rPr>
+              <a:t>;</a:t>
+            </a:r>
+            <a:endParaRPr lang="ru-RU" sz="1400" dirty="0" smtClean="0">
+              <a:solidFill>
+                <a:srgbClr val="000000"/>
+              </a:solidFill>
+              <a:latin typeface="Courier New" pitchFamily="49" charset="0"/>
+              <a:cs typeface="Courier New" pitchFamily="49" charset="0"/>
+            </a:endParaRPr>
+          </a:p>
+          <a:p>
+            <a:r>
+              <a:rPr lang="ru-RU" sz="1400" dirty="0">
+                <a:solidFill>
+                  <a:srgbClr val="000000"/>
+                </a:solidFill>
+                <a:latin typeface="Courier New" pitchFamily="49" charset="0"/>
+                <a:cs typeface="Courier New" pitchFamily="49" charset="0"/>
+              </a:rPr>
+              <a:t> </a:t>
+            </a:r>
+            <a:r>
+              <a:rPr lang="ru-RU" sz="1400" dirty="0" smtClean="0">
+                <a:solidFill>
+                  <a:srgbClr val="000000"/>
+                </a:solidFill>
+                <a:latin typeface="Courier New" pitchFamily="49" charset="0"/>
+                <a:cs typeface="Courier New" pitchFamily="49" charset="0"/>
+              </a:rPr>
+              <a:t>       </a:t>
+            </a:r>
+            <a:endParaRPr lang="en-US" sz="1400" dirty="0">
+              <a:solidFill>
+                <a:srgbClr val="000000"/>
+              </a:solidFill>
+              <a:latin typeface="Courier New" pitchFamily="49" charset="0"/>
+              <a:cs typeface="Courier New" pitchFamily="49" charset="0"/>
+            </a:endParaRPr>
+          </a:p>
+          <a:p>
+            <a:r>
+              <a:rPr lang="ru-RU" sz="1400" dirty="0" smtClean="0">
+                <a:solidFill>
+                  <a:srgbClr val="000000"/>
+                </a:solidFill>
+                <a:latin typeface="Courier New" pitchFamily="49" charset="0"/>
+                <a:cs typeface="Courier New" pitchFamily="49" charset="0"/>
+              </a:rPr>
+              <a:t>        </a:t>
+            </a:r>
+            <a:r>
+              <a:rPr lang="en-US" sz="1400" dirty="0" smtClean="0">
+                <a:solidFill>
+                  <a:srgbClr val="000000"/>
+                </a:solidFill>
+                <a:latin typeface="Courier New" pitchFamily="49" charset="0"/>
+                <a:cs typeface="Courier New" pitchFamily="49" charset="0"/>
+              </a:rPr>
+              <a:t>[</a:t>
+            </a:r>
+            <a:r>
+              <a:rPr lang="en-US" sz="1400" dirty="0" err="1">
+                <a:solidFill>
+                  <a:srgbClr val="000000"/>
+                </a:solidFill>
+                <a:latin typeface="Courier New" pitchFamily="49" charset="0"/>
+                <a:cs typeface="Courier New" pitchFamily="49" charset="0"/>
+              </a:rPr>
+              <a:t>DataMember</a:t>
+            </a:r>
+            <a:r>
+              <a:rPr lang="en-US" sz="1400" dirty="0">
+                <a:solidFill>
+                  <a:srgbClr val="000000"/>
+                </a:solidFill>
+                <a:latin typeface="Courier New" pitchFamily="49" charset="0"/>
+                <a:cs typeface="Courier New" pitchFamily="49" charset="0"/>
+              </a:rPr>
+              <a:t>(Name="Bid")]</a:t>
+            </a:r>
+          </a:p>
+          <a:p>
+            <a:r>
+              <a:rPr lang="ru-RU" sz="1400" dirty="0" smtClean="0">
+                <a:solidFill>
+                  <a:srgbClr val="000000"/>
+                </a:solidFill>
+                <a:latin typeface="Courier New" pitchFamily="49" charset="0"/>
+                <a:cs typeface="Courier New" pitchFamily="49" charset="0"/>
+              </a:rPr>
+              <a:t>        </a:t>
+            </a:r>
+            <a:r>
+              <a:rPr lang="en-US" sz="1400" dirty="0" smtClean="0">
+                <a:solidFill>
+                  <a:srgbClr val="000000"/>
+                </a:solidFill>
+                <a:latin typeface="Courier New" pitchFamily="49" charset="0"/>
+                <a:cs typeface="Courier New" pitchFamily="49" charset="0"/>
+              </a:rPr>
+              <a:t>public </a:t>
+            </a:r>
+            <a:r>
+              <a:rPr lang="en-US" sz="1400" dirty="0">
+                <a:solidFill>
+                  <a:srgbClr val="000000"/>
+                </a:solidFill>
+                <a:latin typeface="Courier New" pitchFamily="49" charset="0"/>
+                <a:cs typeface="Courier New" pitchFamily="49" charset="0"/>
+              </a:rPr>
+              <a:t>decimal Bid;</a:t>
+            </a:r>
+          </a:p>
+          <a:p>
+            <a:r>
+              <a:rPr lang="ru-RU" sz="1400" dirty="0" smtClean="0">
+                <a:solidFill>
+                  <a:srgbClr val="000000"/>
+                </a:solidFill>
+                <a:latin typeface="Courier New" pitchFamily="49" charset="0"/>
+                <a:cs typeface="Courier New" pitchFamily="49" charset="0"/>
+              </a:rPr>
+              <a:t>        </a:t>
+            </a:r>
+          </a:p>
+          <a:p>
+            <a:r>
+              <a:rPr lang="ru-RU" sz="1400" dirty="0" smtClean="0">
+                <a:solidFill>
+                  <a:srgbClr val="000000"/>
+                </a:solidFill>
+                <a:latin typeface="Courier New" pitchFamily="49" charset="0"/>
+                <a:cs typeface="Courier New" pitchFamily="49" charset="0"/>
+              </a:rPr>
+              <a:t>        </a:t>
+            </a:r>
+            <a:r>
+              <a:rPr lang="en-US" sz="1400" dirty="0" smtClean="0">
+                <a:solidFill>
+                  <a:srgbClr val="000000"/>
+                </a:solidFill>
+                <a:latin typeface="Courier New" pitchFamily="49" charset="0"/>
+                <a:cs typeface="Courier New" pitchFamily="49" charset="0"/>
+              </a:rPr>
+              <a:t>[</a:t>
+            </a:r>
+            <a:r>
+              <a:rPr lang="en-US" sz="1400" dirty="0" err="1">
+                <a:solidFill>
+                  <a:srgbClr val="000000"/>
+                </a:solidFill>
+                <a:latin typeface="Courier New" pitchFamily="49" charset="0"/>
+                <a:cs typeface="Courier New" pitchFamily="49" charset="0"/>
+              </a:rPr>
+              <a:t>DataMember</a:t>
+            </a:r>
+            <a:r>
+              <a:rPr lang="en-US" sz="1400" dirty="0">
+                <a:solidFill>
+                  <a:srgbClr val="000000"/>
+                </a:solidFill>
+                <a:latin typeface="Courier New" pitchFamily="49" charset="0"/>
+                <a:cs typeface="Courier New" pitchFamily="49" charset="0"/>
+              </a:rPr>
+              <a:t>(Name="Ask")]</a:t>
+            </a:r>
+          </a:p>
+          <a:p>
+            <a:r>
+              <a:rPr lang="ru-RU" sz="1400" dirty="0" smtClean="0">
+                <a:solidFill>
+                  <a:srgbClr val="000000"/>
+                </a:solidFill>
+                <a:latin typeface="Courier New" pitchFamily="49" charset="0"/>
+                <a:cs typeface="Courier New" pitchFamily="49" charset="0"/>
+              </a:rPr>
+              <a:t>        </a:t>
+            </a:r>
+            <a:r>
+              <a:rPr lang="en-US" sz="1400" dirty="0" smtClean="0">
+                <a:solidFill>
+                  <a:srgbClr val="000000"/>
+                </a:solidFill>
+                <a:latin typeface="Courier New" pitchFamily="49" charset="0"/>
+                <a:cs typeface="Courier New" pitchFamily="49" charset="0"/>
+              </a:rPr>
+              <a:t>public </a:t>
+            </a:r>
+            <a:r>
+              <a:rPr lang="en-US" sz="1400" dirty="0">
+                <a:solidFill>
+                  <a:srgbClr val="000000"/>
+                </a:solidFill>
+                <a:latin typeface="Courier New" pitchFamily="49" charset="0"/>
+                <a:cs typeface="Courier New" pitchFamily="49" charset="0"/>
+              </a:rPr>
+              <a:t>decimal Ask;</a:t>
+            </a:r>
+          </a:p>
+          <a:p>
+            <a:r>
+              <a:rPr lang="ru-RU" sz="1400" dirty="0" smtClean="0">
+                <a:solidFill>
+                  <a:srgbClr val="000000"/>
+                </a:solidFill>
+                <a:latin typeface="Courier New" pitchFamily="49" charset="0"/>
+                <a:cs typeface="Courier New" pitchFamily="49" charset="0"/>
+              </a:rPr>
+              <a:t>        </a:t>
+            </a:r>
+          </a:p>
+          <a:p>
+            <a:r>
+              <a:rPr lang="ru-RU" sz="1400" dirty="0" smtClean="0">
+                <a:solidFill>
+                  <a:srgbClr val="000000"/>
+                </a:solidFill>
+                <a:latin typeface="Courier New" pitchFamily="49" charset="0"/>
+                <a:cs typeface="Courier New" pitchFamily="49" charset="0"/>
+              </a:rPr>
+              <a:t>        </a:t>
+            </a:r>
+            <a:r>
+              <a:rPr lang="en-US" sz="1400" dirty="0" smtClean="0">
+                <a:solidFill>
+                  <a:srgbClr val="000000"/>
+                </a:solidFill>
+                <a:latin typeface="Courier New" pitchFamily="49" charset="0"/>
+                <a:cs typeface="Courier New" pitchFamily="49" charset="0"/>
+              </a:rPr>
+              <a:t>[</a:t>
+            </a:r>
+            <a:r>
+              <a:rPr lang="en-US" sz="1400" dirty="0" err="1">
+                <a:solidFill>
+                  <a:srgbClr val="000000"/>
+                </a:solidFill>
+                <a:latin typeface="Courier New" pitchFamily="49" charset="0"/>
+                <a:cs typeface="Courier New" pitchFamily="49" charset="0"/>
+              </a:rPr>
+              <a:t>DataMember</a:t>
+            </a:r>
+            <a:r>
+              <a:rPr lang="en-US" sz="1400" dirty="0">
+                <a:solidFill>
+                  <a:srgbClr val="000000"/>
+                </a:solidFill>
+                <a:latin typeface="Courier New" pitchFamily="49" charset="0"/>
+                <a:cs typeface="Courier New" pitchFamily="49" charset="0"/>
+              </a:rPr>
+              <a:t>(Name="Publisher")]</a:t>
+            </a:r>
+          </a:p>
+          <a:p>
+            <a:r>
+              <a:rPr lang="ru-RU" sz="1400" dirty="0" smtClean="0">
+                <a:solidFill>
+                  <a:srgbClr val="000000"/>
+                </a:solidFill>
+                <a:latin typeface="Courier New" pitchFamily="49" charset="0"/>
+                <a:cs typeface="Courier New" pitchFamily="49" charset="0"/>
+              </a:rPr>
+              <a:t>        </a:t>
+            </a:r>
+            <a:r>
+              <a:rPr lang="en-US" sz="1400" dirty="0" smtClean="0">
+                <a:solidFill>
+                  <a:srgbClr val="000000"/>
+                </a:solidFill>
+                <a:latin typeface="Courier New" pitchFamily="49" charset="0"/>
+                <a:cs typeface="Courier New" pitchFamily="49" charset="0"/>
+              </a:rPr>
+              <a:t>public </a:t>
+            </a:r>
+            <a:r>
+              <a:rPr lang="en-US" sz="1400" dirty="0">
+                <a:solidFill>
+                  <a:srgbClr val="000000"/>
+                </a:solidFill>
+                <a:latin typeface="Courier New" pitchFamily="49" charset="0"/>
+                <a:cs typeface="Courier New" pitchFamily="49" charset="0"/>
+              </a:rPr>
+              <a:t>string Publisher;</a:t>
+            </a:r>
+          </a:p>
+          <a:p>
+            <a:r>
+              <a:rPr lang="ru-RU" sz="1400" dirty="0" smtClean="0">
+                <a:solidFill>
+                  <a:srgbClr val="000000"/>
+                </a:solidFill>
+                <a:latin typeface="Courier New" pitchFamily="49" charset="0"/>
+                <a:cs typeface="Courier New" pitchFamily="49" charset="0"/>
+              </a:rPr>
+              <a:t>        </a:t>
+            </a:r>
+          </a:p>
+          <a:p>
+            <a:r>
+              <a:rPr lang="ru-RU" sz="1400" dirty="0" smtClean="0">
+                <a:solidFill>
+                  <a:srgbClr val="000000"/>
+                </a:solidFill>
+                <a:latin typeface="Courier New" pitchFamily="49" charset="0"/>
+                <a:cs typeface="Courier New" pitchFamily="49" charset="0"/>
+              </a:rPr>
+              <a:t>        </a:t>
+            </a:r>
+            <a:r>
+              <a:rPr lang="en-US" sz="1400" dirty="0" smtClean="0">
+                <a:solidFill>
+                  <a:srgbClr val="000000"/>
+                </a:solidFill>
+                <a:latin typeface="Courier New" pitchFamily="49" charset="0"/>
+                <a:cs typeface="Courier New" pitchFamily="49" charset="0"/>
+              </a:rPr>
+              <a:t>[</a:t>
+            </a:r>
+            <a:r>
+              <a:rPr lang="en-US" sz="1400" dirty="0" err="1">
+                <a:solidFill>
+                  <a:srgbClr val="000000"/>
+                </a:solidFill>
+                <a:latin typeface="Courier New" pitchFamily="49" charset="0"/>
+                <a:cs typeface="Courier New" pitchFamily="49" charset="0"/>
+              </a:rPr>
+              <a:t>DataMember</a:t>
+            </a:r>
+            <a:r>
+              <a:rPr lang="en-US" sz="1400" dirty="0">
+                <a:solidFill>
+                  <a:srgbClr val="000000"/>
+                </a:solidFill>
+                <a:latin typeface="Courier New" pitchFamily="49" charset="0"/>
+                <a:cs typeface="Courier New" pitchFamily="49" charset="0"/>
+              </a:rPr>
+              <a:t>(Name="</a:t>
+            </a:r>
+            <a:r>
+              <a:rPr lang="en-US" sz="1400" dirty="0" err="1">
+                <a:solidFill>
+                  <a:srgbClr val="000000"/>
+                </a:solidFill>
+                <a:latin typeface="Courier New" pitchFamily="49" charset="0"/>
+                <a:cs typeface="Courier New" pitchFamily="49" charset="0"/>
+              </a:rPr>
+              <a:t>UpdateDateTime</a:t>
+            </a:r>
+            <a:r>
+              <a:rPr lang="en-US" sz="1400" dirty="0">
+                <a:solidFill>
+                  <a:srgbClr val="000000"/>
+                </a:solidFill>
+                <a:latin typeface="Courier New" pitchFamily="49" charset="0"/>
+                <a:cs typeface="Courier New" pitchFamily="49" charset="0"/>
+              </a:rPr>
+              <a:t>")]</a:t>
+            </a:r>
+          </a:p>
+          <a:p>
+            <a:r>
+              <a:rPr lang="ru-RU" sz="1400" dirty="0" smtClean="0">
+                <a:solidFill>
+                  <a:srgbClr val="000000"/>
+                </a:solidFill>
+                <a:latin typeface="Courier New" pitchFamily="49" charset="0"/>
+                <a:cs typeface="Courier New" pitchFamily="49" charset="0"/>
+              </a:rPr>
+              <a:t>        </a:t>
+            </a:r>
+            <a:r>
+              <a:rPr lang="en-US" sz="1400" dirty="0" smtClean="0">
+                <a:solidFill>
+                  <a:srgbClr val="000000"/>
+                </a:solidFill>
+                <a:latin typeface="Courier New" pitchFamily="49" charset="0"/>
+                <a:cs typeface="Courier New" pitchFamily="49" charset="0"/>
+              </a:rPr>
+              <a:t>private </a:t>
+            </a:r>
+            <a:r>
+              <a:rPr lang="en-US" sz="1400" dirty="0" err="1">
+                <a:solidFill>
+                  <a:srgbClr val="000000"/>
+                </a:solidFill>
+                <a:latin typeface="Courier New" pitchFamily="49" charset="0"/>
+                <a:cs typeface="Courier New" pitchFamily="49" charset="0"/>
+              </a:rPr>
+              <a:t>DateTime</a:t>
+            </a:r>
+            <a:r>
+              <a:rPr lang="en-US" sz="1400" dirty="0">
+                <a:solidFill>
+                  <a:srgbClr val="000000"/>
+                </a:solidFill>
+                <a:latin typeface="Courier New" pitchFamily="49" charset="0"/>
+                <a:cs typeface="Courier New" pitchFamily="49" charset="0"/>
+              </a:rPr>
+              <a:t> </a:t>
+            </a:r>
+            <a:r>
+              <a:rPr lang="en-US" sz="1400" dirty="0" err="1">
+                <a:solidFill>
+                  <a:srgbClr val="000000"/>
+                </a:solidFill>
+                <a:latin typeface="Courier New" pitchFamily="49" charset="0"/>
+                <a:cs typeface="Courier New" pitchFamily="49" charset="0"/>
+              </a:rPr>
+              <a:t>UpdateDateTime</a:t>
+            </a:r>
+            <a:r>
+              <a:rPr lang="en-US" sz="1400" dirty="0">
+                <a:solidFill>
+                  <a:srgbClr val="000000"/>
+                </a:solidFill>
+                <a:latin typeface="Courier New" pitchFamily="49" charset="0"/>
+                <a:cs typeface="Courier New" pitchFamily="49" charset="0"/>
+              </a:rPr>
+              <a:t>;</a:t>
+            </a:r>
+          </a:p>
+          <a:p>
+            <a:r>
+              <a:rPr lang="ru-RU" sz="1400" dirty="0" smtClean="0">
+                <a:solidFill>
+                  <a:srgbClr val="000000"/>
+                </a:solidFill>
+                <a:latin typeface="Courier New" pitchFamily="49" charset="0"/>
+                <a:cs typeface="Courier New" pitchFamily="49" charset="0"/>
+              </a:rPr>
+              <a:t>    </a:t>
+            </a:r>
+            <a:r>
+              <a:rPr lang="en-US" sz="1400" dirty="0" smtClean="0">
                 <a:solidFill>
                   <a:srgbClr val="000000"/>
                 </a:solidFill>
@@ -6944,7 +7080,26 @@
               </a:rPr>
               <a:t>}</a:t>
             </a:r>
-            <a:endParaRPr lang="en-US" sz="1600" dirty="0" smtClean="0">
+            <a:endParaRPr lang="en-US" sz="1400" dirty="0">
+              <a:solidFill>
+                <a:srgbClr val="000000"/>
+              </a:solidFill>
+              <a:latin typeface="Courier New" pitchFamily="49" charset="0"/>
+              <a:cs typeface="Courier New" pitchFamily="49" charset="0"/>
+            </a:endParaRPr>
+          </a:p>
+          <a:p>
+            <a:r>
+              <a:rPr lang="en-US" sz="1400" dirty="0">
+                <a:solidFill>
+                  <a:srgbClr val="000000"/>
+                </a:solidFill>
+                <a:latin typeface="Courier New" pitchFamily="49" charset="0"/>
+                <a:cs typeface="Courier New" pitchFamily="49" charset="0"/>
+              </a:rPr>
+              <a:t>}</a:t>
+            </a:r>
+            <a:endParaRPr lang="en-US" sz="1400" dirty="0" smtClean="0">
               <a:solidFill>
                 <a:srgbClr val="000000"/>
               </a:solidFill>

</xml_diff>